<commit_message>
modified ppt on date 10-05-2022
</commit_message>
<xml_diff>
--- a/Lender club case study.pptx
+++ b/Lender club case study.pptx
@@ -5,10 +5,10 @@
     <p:sldMasterId id="2147483648" r:id="rId4"/>
   </p:sldMasterIdLst>
   <p:notesMasterIdLst>
-    <p:notesMasterId r:id="rId13"/>
+    <p:notesMasterId r:id="rId17"/>
   </p:notesMasterIdLst>
   <p:handoutMasterIdLst>
-    <p:handoutMasterId r:id="rId14"/>
+    <p:handoutMasterId r:id="rId18"/>
   </p:handoutMasterIdLst>
   <p:sldIdLst>
     <p:sldId id="256" r:id="rId5"/>
@@ -18,7 +18,11 @@
     <p:sldId id="286" r:id="rId9"/>
     <p:sldId id="288" r:id="rId10"/>
     <p:sldId id="284" r:id="rId11"/>
-    <p:sldId id="269" r:id="rId12"/>
+    <p:sldId id="289" r:id="rId12"/>
+    <p:sldId id="290" r:id="rId13"/>
+    <p:sldId id="291" r:id="rId14"/>
+    <p:sldId id="292" r:id="rId15"/>
+    <p:sldId id="269" r:id="rId16"/>
   </p:sldIdLst>
   <p:sldSz cx="12192000" cy="6858000"/>
   <p:notesSz cx="6858000" cy="9144000"/>
@@ -139,917 +143,6 @@
 </p:presentation>
 </file>
 
-<file path=ppt/charts/chart1.xml><?xml version="1.0" encoding="utf-8"?>
-<c:chartSpace xmlns:c="http://schemas.openxmlformats.org/drawingml/2006/chart" xmlns:a="http://schemas.openxmlformats.org/drawingml/2006/main" xmlns:r="http://schemas.openxmlformats.org/officeDocument/2006/relationships" xmlns:c16r2="http://schemas.microsoft.com/office/drawing/2015/06/chart">
-  <c:date1904 val="0"/>
-  <c:lang val="en-US"/>
-  <c:roundedCorners val="0"/>
-  <mc:AlternateContent xmlns:mc="http://schemas.openxmlformats.org/markup-compatibility/2006">
-    <mc:Choice xmlns:c14="http://schemas.microsoft.com/office/drawing/2007/8/2/chart" Requires="c14">
-      <c14:style val="102"/>
-    </mc:Choice>
-    <mc:Fallback>
-      <c:style val="2"/>
-    </mc:Fallback>
-  </mc:AlternateContent>
-  <c:chart>
-    <c:autoTitleDeleted val="1"/>
-    <c:plotArea>
-      <c:layout/>
-      <c:barChart>
-        <c:barDir val="col"/>
-        <c:grouping val="clustered"/>
-        <c:varyColors val="0"/>
-        <c:ser>
-          <c:idx val="0"/>
-          <c:order val="0"/>
-          <c:tx>
-            <c:strRef>
-              <c:f>Sheet1!$B$1</c:f>
-              <c:strCache>
-                <c:ptCount val="1"/>
-                <c:pt idx="0">
-                  <c:v>Series 1</c:v>
-                </c:pt>
-              </c:strCache>
-            </c:strRef>
-          </c:tx>
-          <c:spPr>
-            <a:solidFill>
-              <a:schemeClr val="accent3"/>
-            </a:solidFill>
-            <a:ln>
-              <a:noFill/>
-            </a:ln>
-            <a:effectLst/>
-          </c:spPr>
-          <c:invertIfNegative val="0"/>
-          <c:dPt>
-            <c:idx val="1"/>
-            <c:invertIfNegative val="0"/>
-            <c:bubble3D val="0"/>
-            <c:spPr>
-              <a:pattFill prst="ltUpDiag">
-                <a:fgClr>
-                  <a:schemeClr val="accent1">
-                    <a:lumMod val="50000"/>
-                  </a:schemeClr>
-                </a:fgClr>
-                <a:bgClr>
-                  <a:schemeClr val="accent6"/>
-                </a:bgClr>
-              </a:pattFill>
-              <a:ln w="12700">
-                <a:solidFill>
-                  <a:schemeClr val="accent6">
-                    <a:lumMod val="60000"/>
-                    <a:lumOff val="40000"/>
-                  </a:schemeClr>
-                </a:solidFill>
-              </a:ln>
-              <a:effectLst/>
-            </c:spPr>
-            <c:extLst>
-              <c:ext xmlns:c16="http://schemas.microsoft.com/office/drawing/2014/chart" uri="{C3380CC4-5D6E-409C-BE32-E72D297353CC}">
-                <c16:uniqueId val="{00000001-73FB-9843-92B3-91A80E32B7C5}"/>
-              </c:ext>
-            </c:extLst>
-          </c:dPt>
-          <c:dPt>
-            <c:idx val="2"/>
-            <c:invertIfNegative val="0"/>
-            <c:bubble3D val="0"/>
-            <c:spPr>
-              <a:pattFill prst="ltUpDiag">
-                <a:fgClr>
-                  <a:schemeClr val="accent1">
-                    <a:lumMod val="50000"/>
-                  </a:schemeClr>
-                </a:fgClr>
-                <a:bgClr>
-                  <a:schemeClr val="accent3"/>
-                </a:bgClr>
-              </a:pattFill>
-              <a:ln w="12700">
-                <a:solidFill>
-                  <a:schemeClr val="accent3">
-                    <a:lumMod val="60000"/>
-                    <a:lumOff val="40000"/>
-                  </a:schemeClr>
-                </a:solidFill>
-              </a:ln>
-              <a:effectLst/>
-            </c:spPr>
-            <c:extLst>
-              <c:ext xmlns:c16="http://schemas.microsoft.com/office/drawing/2014/chart" uri="{C3380CC4-5D6E-409C-BE32-E72D297353CC}">
-                <c16:uniqueId val="{00000007-73FB-9843-92B3-91A80E32B7C5}"/>
-              </c:ext>
-            </c:extLst>
-          </c:dPt>
-          <c:dPt>
-            <c:idx val="3"/>
-            <c:invertIfNegative val="0"/>
-            <c:bubble3D val="0"/>
-            <c:spPr>
-              <a:pattFill prst="ltUpDiag">
-                <a:fgClr>
-                  <a:schemeClr val="accent1">
-                    <a:lumMod val="50000"/>
-                  </a:schemeClr>
-                </a:fgClr>
-                <a:bgClr>
-                  <a:schemeClr val="accent1">
-                    <a:lumMod val="60000"/>
-                    <a:lumOff val="40000"/>
-                  </a:schemeClr>
-                </a:bgClr>
-              </a:pattFill>
-              <a:ln w="12700">
-                <a:solidFill>
-                  <a:schemeClr val="accent1">
-                    <a:lumMod val="40000"/>
-                    <a:lumOff val="60000"/>
-                  </a:schemeClr>
-                </a:solidFill>
-              </a:ln>
-              <a:effectLst/>
-            </c:spPr>
-            <c:extLst>
-              <c:ext xmlns:c16="http://schemas.microsoft.com/office/drawing/2014/chart" uri="{C3380CC4-5D6E-409C-BE32-E72D297353CC}">
-                <c16:uniqueId val="{00000003-73FB-9843-92B3-91A80E32B7C5}"/>
-              </c:ext>
-            </c:extLst>
-          </c:dPt>
-          <c:dPt>
-            <c:idx val="4"/>
-            <c:invertIfNegative val="0"/>
-            <c:bubble3D val="0"/>
-            <c:spPr>
-              <a:pattFill prst="ltUpDiag">
-                <a:fgClr>
-                  <a:schemeClr val="accent1">
-                    <a:lumMod val="50000"/>
-                  </a:schemeClr>
-                </a:fgClr>
-                <a:bgClr>
-                  <a:schemeClr val="accent2"/>
-                </a:bgClr>
-              </a:pattFill>
-              <a:ln w="12700">
-                <a:solidFill>
-                  <a:schemeClr val="accent2">
-                    <a:lumMod val="60000"/>
-                    <a:lumOff val="40000"/>
-                  </a:schemeClr>
-                </a:solidFill>
-              </a:ln>
-              <a:effectLst/>
-            </c:spPr>
-            <c:extLst>
-              <c:ext xmlns:c16="http://schemas.microsoft.com/office/drawing/2014/chart" uri="{C3380CC4-5D6E-409C-BE32-E72D297353CC}">
-                <c16:uniqueId val="{00000005-73FB-9843-92B3-91A80E32B7C5}"/>
-              </c:ext>
-            </c:extLst>
-          </c:dPt>
-          <c:cat>
-            <c:strRef>
-              <c:f>Sheet1!$A$2:$A$6</c:f>
-              <c:strCache>
-                <c:ptCount val="5"/>
-                <c:pt idx="0">
-                  <c:v>20YY</c:v>
-                </c:pt>
-                <c:pt idx="1">
-                  <c:v>20YY</c:v>
-                </c:pt>
-                <c:pt idx="2">
-                  <c:v>20YY</c:v>
-                </c:pt>
-                <c:pt idx="3">
-                  <c:v>20YY</c:v>
-                </c:pt>
-                <c:pt idx="4">
-                  <c:v>20YY</c:v>
-                </c:pt>
-              </c:strCache>
-            </c:strRef>
-          </c:cat>
-          <c:val>
-            <c:numRef>
-              <c:f>Sheet1!$B$2:$B$6</c:f>
-              <c:numCache>
-                <c:formatCode>[$$-409]#,##0</c:formatCode>
-                <c:ptCount val="5"/>
-                <c:pt idx="0">
-                  <c:v>0</c:v>
-                </c:pt>
-                <c:pt idx="1">
-                  <c:v>6750</c:v>
-                </c:pt>
-                <c:pt idx="2">
-                  <c:v>33750</c:v>
-                </c:pt>
-                <c:pt idx="3">
-                  <c:v>135000</c:v>
-                </c:pt>
-                <c:pt idx="4">
-                  <c:v>270000</c:v>
-                </c:pt>
-              </c:numCache>
-            </c:numRef>
-          </c:val>
-          <c:extLst>
-            <c:ext xmlns:c16="http://schemas.microsoft.com/office/drawing/2014/chart" uri="{C3380CC4-5D6E-409C-BE32-E72D297353CC}">
-              <c16:uniqueId val="{00000006-73FB-9843-92B3-91A80E32B7C5}"/>
-            </c:ext>
-          </c:extLst>
-        </c:ser>
-        <c:dLbls>
-          <c:showLegendKey val="0"/>
-          <c:showVal val="0"/>
-          <c:showCatName val="0"/>
-          <c:showSerName val="0"/>
-          <c:showPercent val="0"/>
-          <c:showBubbleSize val="0"/>
-        </c:dLbls>
-        <c:gapWidth val="24"/>
-        <c:axId val="1000041416"/>
-        <c:axId val="1000041744"/>
-      </c:barChart>
-      <c:catAx>
-        <c:axId val="1000041416"/>
-        <c:scaling>
-          <c:orientation val="minMax"/>
-        </c:scaling>
-        <c:delete val="0"/>
-        <c:axPos val="b"/>
-        <c:numFmt formatCode="General" sourceLinked="1"/>
-        <c:majorTickMark val="none"/>
-        <c:minorTickMark val="none"/>
-        <c:tickLblPos val="nextTo"/>
-        <c:spPr>
-          <a:noFill/>
-          <a:ln w="9525" cap="flat" cmpd="sng" algn="ctr">
-            <a:solidFill>
-              <a:schemeClr val="tx1">
-                <a:lumMod val="15000"/>
-                <a:lumOff val="85000"/>
-              </a:schemeClr>
-            </a:solidFill>
-            <a:round/>
-          </a:ln>
-          <a:effectLst/>
-        </c:spPr>
-        <c:txPr>
-          <a:bodyPr rot="-60000000" spcFirstLastPara="1" vertOverflow="ellipsis" vert="horz" wrap="square" anchor="ctr" anchorCtr="1"/>
-          <a:lstStyle/>
-          <a:p>
-            <a:pPr>
-              <a:defRPr sz="1197" b="0" i="0" u="none" strike="noStrike" kern="1200" baseline="0">
-                <a:solidFill>
-                  <a:schemeClr val="bg1"/>
-                </a:solidFill>
-                <a:latin typeface="+mn-lt"/>
-                <a:ea typeface="+mn-ea"/>
-                <a:cs typeface="+mn-cs"/>
-              </a:defRPr>
-            </a:pPr>
-            <a:endParaRPr lang="en-US"/>
-          </a:p>
-        </c:txPr>
-        <c:crossAx val="1000041744"/>
-        <c:crosses val="autoZero"/>
-        <c:auto val="1"/>
-        <c:lblAlgn val="ctr"/>
-        <c:lblOffset val="100"/>
-        <c:noMultiLvlLbl val="0"/>
-      </c:catAx>
-      <c:valAx>
-        <c:axId val="1000041744"/>
-        <c:scaling>
-          <c:orientation val="minMax"/>
-        </c:scaling>
-        <c:delete val="0"/>
-        <c:axPos val="l"/>
-        <c:numFmt formatCode="[$$-409]#,##0" sourceLinked="1"/>
-        <c:majorTickMark val="none"/>
-        <c:minorTickMark val="none"/>
-        <c:tickLblPos val="nextTo"/>
-        <c:spPr>
-          <a:noFill/>
-          <a:ln>
-            <a:noFill/>
-          </a:ln>
-          <a:effectLst/>
-        </c:spPr>
-        <c:txPr>
-          <a:bodyPr rot="-60000000" spcFirstLastPara="1" vertOverflow="ellipsis" vert="horz" wrap="square" anchor="ctr" anchorCtr="1"/>
-          <a:lstStyle/>
-          <a:p>
-            <a:pPr>
-              <a:defRPr sz="1197" b="0" i="0" u="none" strike="noStrike" kern="1200" baseline="0">
-                <a:solidFill>
-                  <a:schemeClr val="bg1"/>
-                </a:solidFill>
-                <a:latin typeface="+mn-lt"/>
-                <a:ea typeface="+mn-ea"/>
-                <a:cs typeface="+mn-cs"/>
-              </a:defRPr>
-            </a:pPr>
-            <a:endParaRPr lang="en-US"/>
-          </a:p>
-        </c:txPr>
-        <c:crossAx val="1000041416"/>
-        <c:crosses val="autoZero"/>
-        <c:crossBetween val="between"/>
-      </c:valAx>
-      <c:spPr>
-        <a:noFill/>
-        <a:ln>
-          <a:noFill/>
-        </a:ln>
-        <a:effectLst/>
-      </c:spPr>
-    </c:plotArea>
-    <c:plotVisOnly val="1"/>
-    <c:dispBlanksAs val="gap"/>
-    <c:extLst>
-      <c:ext xmlns:c16r3="http://schemas.microsoft.com/office/drawing/2017/03/chart" uri="{56B9EC1D-385E-4148-901F-78D8002777C0}">
-        <c16r3:dataDisplayOptions16>
-          <c16r3:dispNaAsBlank val="1"/>
-        </c16r3:dataDisplayOptions16>
-      </c:ext>
-    </c:extLst>
-    <c:showDLblsOverMax val="0"/>
-  </c:chart>
-  <c:spPr>
-    <a:noFill/>
-    <a:ln>
-      <a:noFill/>
-    </a:ln>
-    <a:effectLst/>
-  </c:spPr>
-  <c:txPr>
-    <a:bodyPr/>
-    <a:lstStyle/>
-    <a:p>
-      <a:pPr>
-        <a:defRPr>
-          <a:latin typeface="+mn-lt"/>
-        </a:defRPr>
-      </a:pPr>
-      <a:endParaRPr lang="en-US"/>
-    </a:p>
-  </c:txPr>
-  <c:externalData r:id="rId3">
-    <c:autoUpdate val="0"/>
-  </c:externalData>
-</c:chartSpace>
-</file>
-
-<file path=ppt/charts/colors1.xml><?xml version="1.0" encoding="utf-8"?>
-<cs:colorStyle xmlns:cs="http://schemas.microsoft.com/office/drawing/2012/chartStyle" xmlns:a="http://schemas.openxmlformats.org/drawingml/2006/main" meth="cycle" id="10">
-  <a:schemeClr val="accent1"/>
-  <a:schemeClr val="accent2"/>
-  <a:schemeClr val="accent3"/>
-  <a:schemeClr val="accent4"/>
-  <a:schemeClr val="accent5"/>
-  <a:schemeClr val="accent6"/>
-  <cs:variation/>
-  <cs:variation>
-    <a:lumMod val="60000"/>
-  </cs:variation>
-  <cs:variation>
-    <a:lumMod val="80000"/>
-    <a:lumOff val="20000"/>
-  </cs:variation>
-  <cs:variation>
-    <a:lumMod val="80000"/>
-  </cs:variation>
-  <cs:variation>
-    <a:lumMod val="60000"/>
-    <a:lumOff val="40000"/>
-  </cs:variation>
-  <cs:variation>
-    <a:lumMod val="50000"/>
-  </cs:variation>
-  <cs:variation>
-    <a:lumMod val="70000"/>
-    <a:lumOff val="30000"/>
-  </cs:variation>
-  <cs:variation>
-    <a:lumMod val="70000"/>
-  </cs:variation>
-  <cs:variation>
-    <a:lumMod val="50000"/>
-    <a:lumOff val="50000"/>
-  </cs:variation>
-</cs:colorStyle>
-</file>
-
-<file path=ppt/charts/style1.xml><?xml version="1.0" encoding="utf-8"?>
-<cs:chartStyle xmlns:cs="http://schemas.microsoft.com/office/drawing/2012/chartStyle" xmlns:a="http://schemas.openxmlformats.org/drawingml/2006/main" id="201">
-  <cs:axisTitle>
-    <cs:lnRef idx="0"/>
-    <cs:fillRef idx="0"/>
-    <cs:effectRef idx="0"/>
-    <cs:fontRef idx="minor">
-      <a:schemeClr val="tx1">
-        <a:lumMod val="65000"/>
-        <a:lumOff val="35000"/>
-      </a:schemeClr>
-    </cs:fontRef>
-    <cs:defRPr sz="1330" kern="1200"/>
-  </cs:axisTitle>
-  <cs:categoryAxis>
-    <cs:lnRef idx="0"/>
-    <cs:fillRef idx="0"/>
-    <cs:effectRef idx="0"/>
-    <cs:fontRef idx="minor">
-      <a:schemeClr val="tx1">
-        <a:lumMod val="65000"/>
-        <a:lumOff val="35000"/>
-      </a:schemeClr>
-    </cs:fontRef>
-    <cs:spPr>
-      <a:ln w="9525" cap="flat" cmpd="sng" algn="ctr">
-        <a:solidFill>
-          <a:schemeClr val="tx1">
-            <a:lumMod val="15000"/>
-            <a:lumOff val="85000"/>
-          </a:schemeClr>
-        </a:solidFill>
-        <a:round/>
-      </a:ln>
-    </cs:spPr>
-    <cs:defRPr sz="1197" kern="1200"/>
-  </cs:categoryAxis>
-  <cs:chartArea mods="allowNoFillOverride allowNoLineOverride">
-    <cs:lnRef idx="0"/>
-    <cs:fillRef idx="0"/>
-    <cs:effectRef idx="0"/>
-    <cs:fontRef idx="minor">
-      <a:schemeClr val="tx1"/>
-    </cs:fontRef>
-    <cs:spPr>
-      <a:solidFill>
-        <a:schemeClr val="bg1"/>
-      </a:solidFill>
-      <a:ln w="9525" cap="flat" cmpd="sng" algn="ctr">
-        <a:solidFill>
-          <a:schemeClr val="tx1">
-            <a:lumMod val="15000"/>
-            <a:lumOff val="85000"/>
-          </a:schemeClr>
-        </a:solidFill>
-        <a:round/>
-      </a:ln>
-    </cs:spPr>
-    <cs:defRPr sz="1330" kern="1200"/>
-  </cs:chartArea>
-  <cs:dataLabel>
-    <cs:lnRef idx="0"/>
-    <cs:fillRef idx="0"/>
-    <cs:effectRef idx="0"/>
-    <cs:fontRef idx="minor">
-      <a:schemeClr val="tx1">
-        <a:lumMod val="75000"/>
-        <a:lumOff val="25000"/>
-      </a:schemeClr>
-    </cs:fontRef>
-    <cs:defRPr sz="1197" kern="1200"/>
-  </cs:dataLabel>
-  <cs:dataLabelCallout>
-    <cs:lnRef idx="0"/>
-    <cs:fillRef idx="0"/>
-    <cs:effectRef idx="0"/>
-    <cs:fontRef idx="minor">
-      <a:schemeClr val="dk1">
-        <a:lumMod val="65000"/>
-        <a:lumOff val="35000"/>
-      </a:schemeClr>
-    </cs:fontRef>
-    <cs:spPr>
-      <a:solidFill>
-        <a:schemeClr val="lt1"/>
-      </a:solidFill>
-      <a:ln>
-        <a:solidFill>
-          <a:schemeClr val="dk1">
-            <a:lumMod val="25000"/>
-            <a:lumOff val="75000"/>
-          </a:schemeClr>
-        </a:solidFill>
-      </a:ln>
-    </cs:spPr>
-    <cs:defRPr sz="1197" kern="1200"/>
-    <cs:bodyPr rot="0" spcFirstLastPara="1" vertOverflow="clip" horzOverflow="clip" vert="horz" wrap="square" lIns="36576" tIns="18288" rIns="36576" bIns="18288" anchor="ctr" anchorCtr="1">
-      <a:spAutoFit/>
-    </cs:bodyPr>
-  </cs:dataLabelCallout>
-  <cs:dataPoint>
-    <cs:lnRef idx="0"/>
-    <cs:fillRef idx="1">
-      <cs:styleClr val="auto"/>
-    </cs:fillRef>
-    <cs:effectRef idx="0"/>
-    <cs:fontRef idx="minor">
-      <a:schemeClr val="tx1"/>
-    </cs:fontRef>
-  </cs:dataPoint>
-  <cs:dataPoint3D>
-    <cs:lnRef idx="0"/>
-    <cs:fillRef idx="1">
-      <cs:styleClr val="auto"/>
-    </cs:fillRef>
-    <cs:effectRef idx="0"/>
-    <cs:fontRef idx="minor">
-      <a:schemeClr val="tx1"/>
-    </cs:fontRef>
-  </cs:dataPoint3D>
-  <cs:dataPointLine>
-    <cs:lnRef idx="0">
-      <cs:styleClr val="auto"/>
-    </cs:lnRef>
-    <cs:fillRef idx="1"/>
-    <cs:effectRef idx="0"/>
-    <cs:fontRef idx="minor">
-      <a:schemeClr val="tx1"/>
-    </cs:fontRef>
-    <cs:spPr>
-      <a:ln w="28575" cap="rnd">
-        <a:solidFill>
-          <a:schemeClr val="phClr"/>
-        </a:solidFill>
-        <a:round/>
-      </a:ln>
-    </cs:spPr>
-  </cs:dataPointLine>
-  <cs:dataPointMarker>
-    <cs:lnRef idx="0">
-      <cs:styleClr val="auto"/>
-    </cs:lnRef>
-    <cs:fillRef idx="1">
-      <cs:styleClr val="auto"/>
-    </cs:fillRef>
-    <cs:effectRef idx="0"/>
-    <cs:fontRef idx="minor">
-      <a:schemeClr val="tx1"/>
-    </cs:fontRef>
-    <cs:spPr>
-      <a:ln w="9525">
-        <a:solidFill>
-          <a:schemeClr val="phClr"/>
-        </a:solidFill>
-      </a:ln>
-    </cs:spPr>
-  </cs:dataPointMarker>
-  <cs:dataPointMarkerLayout symbol="circle" size="5"/>
-  <cs:dataPointWireframe>
-    <cs:lnRef idx="0">
-      <cs:styleClr val="auto"/>
-    </cs:lnRef>
-    <cs:fillRef idx="1"/>
-    <cs:effectRef idx="0"/>
-    <cs:fontRef idx="minor">
-      <a:schemeClr val="tx1"/>
-    </cs:fontRef>
-    <cs:spPr>
-      <a:ln w="9525" cap="rnd">
-        <a:solidFill>
-          <a:schemeClr val="phClr"/>
-        </a:solidFill>
-        <a:round/>
-      </a:ln>
-    </cs:spPr>
-  </cs:dataPointWireframe>
-  <cs:dataTable>
-    <cs:lnRef idx="0"/>
-    <cs:fillRef idx="0"/>
-    <cs:effectRef idx="0"/>
-    <cs:fontRef idx="minor">
-      <a:schemeClr val="tx1">
-        <a:lumMod val="65000"/>
-        <a:lumOff val="35000"/>
-      </a:schemeClr>
-    </cs:fontRef>
-    <cs:spPr>
-      <a:noFill/>
-      <a:ln w="9525" cap="flat" cmpd="sng" algn="ctr">
-        <a:solidFill>
-          <a:schemeClr val="tx1">
-            <a:lumMod val="15000"/>
-            <a:lumOff val="85000"/>
-          </a:schemeClr>
-        </a:solidFill>
-        <a:round/>
-      </a:ln>
-    </cs:spPr>
-    <cs:defRPr sz="1197" kern="1200"/>
-  </cs:dataTable>
-  <cs:downBar>
-    <cs:lnRef idx="0"/>
-    <cs:fillRef idx="0"/>
-    <cs:effectRef idx="0"/>
-    <cs:fontRef idx="minor">
-      <a:schemeClr val="dk1"/>
-    </cs:fontRef>
-    <cs:spPr>
-      <a:solidFill>
-        <a:schemeClr val="dk1">
-          <a:lumMod val="65000"/>
-          <a:lumOff val="35000"/>
-        </a:schemeClr>
-      </a:solidFill>
-      <a:ln w="9525">
-        <a:solidFill>
-          <a:schemeClr val="tx1">
-            <a:lumMod val="65000"/>
-            <a:lumOff val="35000"/>
-          </a:schemeClr>
-        </a:solidFill>
-      </a:ln>
-    </cs:spPr>
-  </cs:downBar>
-  <cs:dropLine>
-    <cs:lnRef idx="0"/>
-    <cs:fillRef idx="0"/>
-    <cs:effectRef idx="0"/>
-    <cs:fontRef idx="minor">
-      <a:schemeClr val="tx1"/>
-    </cs:fontRef>
-    <cs:spPr>
-      <a:ln w="9525" cap="flat" cmpd="sng" algn="ctr">
-        <a:solidFill>
-          <a:schemeClr val="tx1">
-            <a:lumMod val="35000"/>
-            <a:lumOff val="65000"/>
-          </a:schemeClr>
-        </a:solidFill>
-        <a:round/>
-      </a:ln>
-    </cs:spPr>
-  </cs:dropLine>
-  <cs:errorBar>
-    <cs:lnRef idx="0"/>
-    <cs:fillRef idx="0"/>
-    <cs:effectRef idx="0"/>
-    <cs:fontRef idx="minor">
-      <a:schemeClr val="tx1"/>
-    </cs:fontRef>
-    <cs:spPr>
-      <a:ln w="9525" cap="flat" cmpd="sng" algn="ctr">
-        <a:solidFill>
-          <a:schemeClr val="tx1">
-            <a:lumMod val="65000"/>
-            <a:lumOff val="35000"/>
-          </a:schemeClr>
-        </a:solidFill>
-        <a:round/>
-      </a:ln>
-    </cs:spPr>
-  </cs:errorBar>
-  <cs:floor>
-    <cs:lnRef idx="0"/>
-    <cs:fillRef idx="0"/>
-    <cs:effectRef idx="0"/>
-    <cs:fontRef idx="minor">
-      <a:schemeClr val="tx1"/>
-    </cs:fontRef>
-    <cs:spPr>
-      <a:noFill/>
-      <a:ln>
-        <a:noFill/>
-      </a:ln>
-    </cs:spPr>
-  </cs:floor>
-  <cs:gridlineMajor>
-    <cs:lnRef idx="0"/>
-    <cs:fillRef idx="0"/>
-    <cs:effectRef idx="0"/>
-    <cs:fontRef idx="minor">
-      <a:schemeClr val="tx1"/>
-    </cs:fontRef>
-    <cs:spPr>
-      <a:ln w="9525" cap="flat" cmpd="sng" algn="ctr">
-        <a:solidFill>
-          <a:schemeClr val="tx1">
-            <a:lumMod val="15000"/>
-            <a:lumOff val="85000"/>
-          </a:schemeClr>
-        </a:solidFill>
-        <a:round/>
-      </a:ln>
-    </cs:spPr>
-  </cs:gridlineMajor>
-  <cs:gridlineMinor>
-    <cs:lnRef idx="0"/>
-    <cs:fillRef idx="0"/>
-    <cs:effectRef idx="0"/>
-    <cs:fontRef idx="minor">
-      <a:schemeClr val="tx1"/>
-    </cs:fontRef>
-    <cs:spPr>
-      <a:ln w="9525" cap="flat" cmpd="sng" algn="ctr">
-        <a:solidFill>
-          <a:schemeClr val="tx1">
-            <a:lumMod val="5000"/>
-            <a:lumOff val="95000"/>
-          </a:schemeClr>
-        </a:solidFill>
-        <a:round/>
-      </a:ln>
-    </cs:spPr>
-  </cs:gridlineMinor>
-  <cs:hiLoLine>
-    <cs:lnRef idx="0"/>
-    <cs:fillRef idx="0"/>
-    <cs:effectRef idx="0"/>
-    <cs:fontRef idx="minor">
-      <a:schemeClr val="tx1"/>
-    </cs:fontRef>
-    <cs:spPr>
-      <a:ln w="9525" cap="flat" cmpd="sng" algn="ctr">
-        <a:solidFill>
-          <a:schemeClr val="tx1">
-            <a:lumMod val="75000"/>
-            <a:lumOff val="25000"/>
-          </a:schemeClr>
-        </a:solidFill>
-        <a:round/>
-      </a:ln>
-    </cs:spPr>
-  </cs:hiLoLine>
-  <cs:leaderLine>
-    <cs:lnRef idx="0"/>
-    <cs:fillRef idx="0"/>
-    <cs:effectRef idx="0"/>
-    <cs:fontRef idx="minor">
-      <a:schemeClr val="tx1"/>
-    </cs:fontRef>
-    <cs:spPr>
-      <a:ln w="9525" cap="flat" cmpd="sng" algn="ctr">
-        <a:solidFill>
-          <a:schemeClr val="tx1">
-            <a:lumMod val="35000"/>
-            <a:lumOff val="65000"/>
-          </a:schemeClr>
-        </a:solidFill>
-        <a:round/>
-      </a:ln>
-    </cs:spPr>
-  </cs:leaderLine>
-  <cs:legend>
-    <cs:lnRef idx="0"/>
-    <cs:fillRef idx="0"/>
-    <cs:effectRef idx="0"/>
-    <cs:fontRef idx="minor">
-      <a:schemeClr val="tx1">
-        <a:lumMod val="65000"/>
-        <a:lumOff val="35000"/>
-      </a:schemeClr>
-    </cs:fontRef>
-    <cs:defRPr sz="1197" kern="1200"/>
-  </cs:legend>
-  <cs:plotArea mods="allowNoFillOverride allowNoLineOverride">
-    <cs:lnRef idx="0"/>
-    <cs:fillRef idx="0"/>
-    <cs:effectRef idx="0"/>
-    <cs:fontRef idx="minor">
-      <a:schemeClr val="tx1"/>
-    </cs:fontRef>
-  </cs:plotArea>
-  <cs:plotArea3D mods="allowNoFillOverride allowNoLineOverride">
-    <cs:lnRef idx="0"/>
-    <cs:fillRef idx="0"/>
-    <cs:effectRef idx="0"/>
-    <cs:fontRef idx="minor">
-      <a:schemeClr val="tx1"/>
-    </cs:fontRef>
-  </cs:plotArea3D>
-  <cs:seriesAxis>
-    <cs:lnRef idx="0"/>
-    <cs:fillRef idx="0"/>
-    <cs:effectRef idx="0"/>
-    <cs:fontRef idx="minor">
-      <a:schemeClr val="tx1">
-        <a:lumMod val="65000"/>
-        <a:lumOff val="35000"/>
-      </a:schemeClr>
-    </cs:fontRef>
-    <cs:defRPr sz="1197" kern="1200"/>
-  </cs:seriesAxis>
-  <cs:seriesLine>
-    <cs:lnRef idx="0"/>
-    <cs:fillRef idx="0"/>
-    <cs:effectRef idx="0"/>
-    <cs:fontRef idx="minor">
-      <a:schemeClr val="tx1"/>
-    </cs:fontRef>
-    <cs:spPr>
-      <a:ln w="9525" cap="flat" cmpd="sng" algn="ctr">
-        <a:solidFill>
-          <a:schemeClr val="tx1">
-            <a:lumMod val="35000"/>
-            <a:lumOff val="65000"/>
-          </a:schemeClr>
-        </a:solidFill>
-        <a:round/>
-      </a:ln>
-    </cs:spPr>
-  </cs:seriesLine>
-  <cs:title>
-    <cs:lnRef idx="0"/>
-    <cs:fillRef idx="0"/>
-    <cs:effectRef idx="0"/>
-    <cs:fontRef idx="minor">
-      <a:schemeClr val="tx1">
-        <a:lumMod val="65000"/>
-        <a:lumOff val="35000"/>
-      </a:schemeClr>
-    </cs:fontRef>
-    <cs:defRPr sz="1862" b="0" kern="1200" spc="0" baseline="0"/>
-  </cs:title>
-  <cs:trendline>
-    <cs:lnRef idx="0">
-      <cs:styleClr val="auto"/>
-    </cs:lnRef>
-    <cs:fillRef idx="0"/>
-    <cs:effectRef idx="0"/>
-    <cs:fontRef idx="minor">
-      <a:schemeClr val="tx1"/>
-    </cs:fontRef>
-    <cs:spPr>
-      <a:ln w="19050" cap="rnd">
-        <a:solidFill>
-          <a:schemeClr val="phClr"/>
-        </a:solidFill>
-        <a:prstDash val="sysDot"/>
-      </a:ln>
-    </cs:spPr>
-  </cs:trendline>
-  <cs:trendlineLabel>
-    <cs:lnRef idx="0"/>
-    <cs:fillRef idx="0"/>
-    <cs:effectRef idx="0"/>
-    <cs:fontRef idx="minor">
-      <a:schemeClr val="tx1">
-        <a:lumMod val="65000"/>
-        <a:lumOff val="35000"/>
-      </a:schemeClr>
-    </cs:fontRef>
-    <cs:defRPr sz="1197" kern="1200"/>
-  </cs:trendlineLabel>
-  <cs:upBar>
-    <cs:lnRef idx="0"/>
-    <cs:fillRef idx="0"/>
-    <cs:effectRef idx="0"/>
-    <cs:fontRef idx="minor">
-      <a:schemeClr val="dk1"/>
-    </cs:fontRef>
-    <cs:spPr>
-      <a:solidFill>
-        <a:schemeClr val="lt1"/>
-      </a:solidFill>
-      <a:ln w="9525">
-        <a:solidFill>
-          <a:schemeClr val="tx1">
-            <a:lumMod val="15000"/>
-            <a:lumOff val="85000"/>
-          </a:schemeClr>
-        </a:solidFill>
-      </a:ln>
-    </cs:spPr>
-  </cs:upBar>
-  <cs:valueAxis>
-    <cs:lnRef idx="0"/>
-    <cs:fillRef idx="0"/>
-    <cs:effectRef idx="0"/>
-    <cs:fontRef idx="minor">
-      <a:schemeClr val="tx1">
-        <a:lumMod val="65000"/>
-        <a:lumOff val="35000"/>
-      </a:schemeClr>
-    </cs:fontRef>
-    <cs:defRPr sz="1197" kern="1200"/>
-  </cs:valueAxis>
-  <cs:wall>
-    <cs:lnRef idx="0"/>
-    <cs:fillRef idx="0"/>
-    <cs:effectRef idx="0"/>
-    <cs:fontRef idx="minor">
-      <a:schemeClr val="tx1"/>
-    </cs:fontRef>
-    <cs:spPr>
-      <a:noFill/>
-      <a:ln>
-        <a:noFill/>
-      </a:ln>
-    </cs:spPr>
-  </cs:wall>
-</cs:chartStyle>
-</file>
-
 <file path=ppt/handoutMasters/handoutMaster1.xml><?xml version="1.0" encoding="utf-8"?>
 <p:handoutMaster xmlns:a="http://schemas.openxmlformats.org/drawingml/2006/main" xmlns:r="http://schemas.openxmlformats.org/officeDocument/2006/relationships" xmlns:p="http://schemas.openxmlformats.org/presentationml/2006/main">
   <p:cSld>
@@ -1144,7 +237,7 @@
           <a:p>
             <a:fld id="{1CA5457B-CDAE-4DEB-AEC8-C82DE2312E37}" type="datetimeFigureOut">
               <a:rPr lang="en-US" smtClean="0"/>
-              <a:t>5/9/2022</a:t>
+              <a:t>5/10/2022</a:t>
             </a:fld>
             <a:endParaRPr lang="en-US" dirty="0"/>
           </a:p>
@@ -1321,7 +414,7 @@
           <a:p>
             <a:fld id="{090B78EA-28CE-41D8-9043-90E391E5F567}" type="datetimeFigureOut">
               <a:rPr lang="en-US" noProof="0" smtClean="0"/>
-              <a:t>5/9/2022</a:t>
+              <a:t>5/10/2022</a:t>
             </a:fld>
             <a:endParaRPr lang="en-US" noProof="0" dirty="0"/>
           </a:p>
@@ -26462,6 +25555,410 @@
 </p:sld>
 </file>
 
+<file path=ppt/slides/slide10.xml><?xml version="1.0" encoding="utf-8"?>
+<p:sld xmlns:a="http://schemas.openxmlformats.org/drawingml/2006/main" xmlns:r="http://schemas.openxmlformats.org/officeDocument/2006/relationships" xmlns:p="http://schemas.openxmlformats.org/presentationml/2006/main">
+  <p:cSld>
+    <p:spTree>
+      <p:nvGrpSpPr>
+        <p:cNvPr id="1" name=""/>
+        <p:cNvGrpSpPr/>
+        <p:nvPr/>
+      </p:nvGrpSpPr>
+      <p:grpSpPr>
+        <a:xfrm>
+          <a:off x="0" y="0"/>
+          <a:ext cx="0" cy="0"/>
+          <a:chOff x="0" y="0"/>
+          <a:chExt cx="0" cy="0"/>
+        </a:xfrm>
+      </p:grpSpPr>
+      <p:sp>
+        <p:nvSpPr>
+          <p:cNvPr id="5" name="Title 4">
+            <a:extLst>
+              <a:ext uri="{FF2B5EF4-FFF2-40B4-BE49-F238E27FC236}">
+                <a16:creationId xmlns:a16="http://schemas.microsoft.com/office/drawing/2014/main" id="{201323FB-427E-4A8D-B473-AB0657D8D23B}"/>
+              </a:ext>
+            </a:extLst>
+          </p:cNvPr>
+          <p:cNvSpPr>
+            <a:spLocks noGrp="1"/>
+          </p:cNvSpPr>
+          <p:nvPr>
+            <p:ph type="title"/>
+          </p:nvPr>
+        </p:nvSpPr>
+        <p:spPr>
+          <a:xfrm>
+            <a:off x="444500" y="542925"/>
+            <a:ext cx="11214100" cy="535531"/>
+          </a:xfrm>
+        </p:spPr>
+        <p:txBody>
+          <a:bodyPr wrap="square" anchor="t">
+            <a:normAutofit/>
+          </a:bodyPr>
+          <a:lstStyle/>
+          <a:p>
+            <a:r>
+              <a:rPr lang="en-US" sz="1500" dirty="0"/>
+              <a:t>Observations :- Graph shows employee tenure of borrower is affecting loan default rate. Graph clearly shows than employee with more than 10+ years of experience are more likely defaulted person</a:t>
+            </a:r>
+          </a:p>
+        </p:txBody>
+      </p:sp>
+      <p:sp>
+        <p:nvSpPr>
+          <p:cNvPr id="2" name="Slide Number Placeholder 1">
+            <a:extLst>
+              <a:ext uri="{FF2B5EF4-FFF2-40B4-BE49-F238E27FC236}">
+                <a16:creationId xmlns:a16="http://schemas.microsoft.com/office/drawing/2014/main" id="{E4398C1C-6656-4A73-A680-62A81CDC27FD}"/>
+              </a:ext>
+            </a:extLst>
+          </p:cNvPr>
+          <p:cNvSpPr>
+            <a:spLocks noGrp="1"/>
+          </p:cNvSpPr>
+          <p:nvPr>
+            <p:ph type="sldNum" sz="quarter" idx="12"/>
+          </p:nvPr>
+        </p:nvSpPr>
+        <p:spPr>
+          <a:xfrm>
+            <a:off x="11252200" y="6315075"/>
+            <a:ext cx="406400" cy="365125"/>
+          </a:xfrm>
+        </p:spPr>
+        <p:txBody>
+          <a:bodyPr anchor="ctr">
+            <a:normAutofit/>
+          </a:bodyPr>
+          <a:lstStyle/>
+          <a:p>
+            <a:pPr>
+              <a:spcAft>
+                <a:spcPts val="600"/>
+              </a:spcAft>
+            </a:pPr>
+            <a:fld id="{C263D6C4-4840-40CC-AC84-17E24B3B7BDE}" type="slidenum">
+              <a:rPr lang="en-US" smtClean="0"/>
+              <a:pPr>
+                <a:spcAft>
+                  <a:spcPts val="600"/>
+                </a:spcAft>
+              </a:pPr>
+              <a:t>10</a:t>
+            </a:fld>
+            <a:endParaRPr lang="en-US"/>
+          </a:p>
+        </p:txBody>
+      </p:sp>
+      <p:pic>
+        <p:nvPicPr>
+          <p:cNvPr id="4098" name="Picture 2">
+            <a:extLst>
+              <a:ext uri="{FF2B5EF4-FFF2-40B4-BE49-F238E27FC236}">
+                <a16:creationId xmlns:a16="http://schemas.microsoft.com/office/drawing/2014/main" id="{12EF800B-F0A2-6489-640B-7993BDB4D140}"/>
+              </a:ext>
+            </a:extLst>
+          </p:cNvPr>
+          <p:cNvPicPr>
+            <a:picLocks noChangeAspect="1" noChangeArrowheads="1"/>
+          </p:cNvPicPr>
+          <p:nvPr/>
+        </p:nvPicPr>
+        <p:blipFill>
+          <a:blip r:embed="rId2">
+            <a:extLst>
+              <a:ext uri="{28A0092B-C50C-407E-A947-70E740481C1C}">
+                <a14:useLocalDpi xmlns:a14="http://schemas.microsoft.com/office/drawing/2010/main" val="0"/>
+              </a:ext>
+            </a:extLst>
+          </a:blip>
+          <a:stretch>
+            <a:fillRect/>
+          </a:stretch>
+        </p:blipFill>
+        <p:spPr bwMode="auto">
+          <a:xfrm>
+            <a:off x="731520" y="1825625"/>
+            <a:ext cx="10072468" cy="4351338"/>
+          </a:xfrm>
+          <a:prstGeom prst="rect">
+            <a:avLst/>
+          </a:prstGeom>
+          <a:solidFill>
+            <a:srgbClr val="FFFFFF"/>
+          </a:solidFill>
+          <a:extLst>
+            <a:ext uri="{909E8E84-426E-40DD-AFC4-6F175D3DCCD1}">
+              <a14:hiddenFill xmlns:a14="http://schemas.microsoft.com/office/drawing/2010/main">
+                <a:solidFill>
+                  <a:srgbClr val="FFFFFF"/>
+                </a:solidFill>
+              </a14:hiddenFill>
+            </a:ext>
+          </a:extLst>
+        </p:spPr>
+      </p:pic>
+    </p:spTree>
+    <p:extLst>
+      <p:ext uri="{BB962C8B-B14F-4D97-AF65-F5344CB8AC3E}">
+        <p14:creationId xmlns:p14="http://schemas.microsoft.com/office/powerpoint/2010/main" val="1187674041"/>
+      </p:ext>
+    </p:extLst>
+  </p:cSld>
+  <p:clrMapOvr>
+    <a:masterClrMapping/>
+  </p:clrMapOvr>
+  <mc:AlternateContent xmlns:mc="http://schemas.openxmlformats.org/markup-compatibility/2006">
+    <mc:Choice xmlns:p14="http://schemas.microsoft.com/office/powerpoint/2010/main" Requires="p14">
+      <p:transition spd="med" p14:dur="700">
+        <p:fade/>
+      </p:transition>
+    </mc:Choice>
+    <mc:Fallback>
+      <p:transition spd="med">
+        <p:fade/>
+      </p:transition>
+    </mc:Fallback>
+  </mc:AlternateContent>
+</p:sld>
+</file>
+
+<file path=ppt/slides/slide11.xml><?xml version="1.0" encoding="utf-8"?>
+<p:sld xmlns:a="http://schemas.openxmlformats.org/drawingml/2006/main" xmlns:r="http://schemas.openxmlformats.org/officeDocument/2006/relationships" xmlns:p="http://schemas.openxmlformats.org/presentationml/2006/main">
+  <p:cSld>
+    <p:spTree>
+      <p:nvGrpSpPr>
+        <p:cNvPr id="1" name=""/>
+        <p:cNvGrpSpPr/>
+        <p:nvPr/>
+      </p:nvGrpSpPr>
+      <p:grpSpPr>
+        <a:xfrm>
+          <a:off x="0" y="0"/>
+          <a:ext cx="0" cy="0"/>
+          <a:chOff x="0" y="0"/>
+          <a:chExt cx="0" cy="0"/>
+        </a:xfrm>
+      </p:grpSpPr>
+      <p:sp>
+        <p:nvSpPr>
+          <p:cNvPr id="5" name="Title 4">
+            <a:extLst>
+              <a:ext uri="{FF2B5EF4-FFF2-40B4-BE49-F238E27FC236}">
+                <a16:creationId xmlns:a16="http://schemas.microsoft.com/office/drawing/2014/main" id="{201323FB-427E-4A8D-B473-AB0657D8D23B}"/>
+              </a:ext>
+            </a:extLst>
+          </p:cNvPr>
+          <p:cNvSpPr>
+            <a:spLocks noGrp="1"/>
+          </p:cNvSpPr>
+          <p:nvPr>
+            <p:ph type="title"/>
+          </p:nvPr>
+        </p:nvSpPr>
+        <p:spPr>
+          <a:xfrm>
+            <a:off x="444500" y="542925"/>
+            <a:ext cx="11214100" cy="535531"/>
+          </a:xfrm>
+        </p:spPr>
+        <p:txBody>
+          <a:bodyPr wrap="square" anchor="t">
+            <a:normAutofit/>
+          </a:bodyPr>
+          <a:lstStyle/>
+          <a:p>
+            <a:r>
+              <a:rPr lang="en-US" sz="1500" dirty="0"/>
+              <a:t>Observations :- Rented person are more likely default loan than person who own house</a:t>
+            </a:r>
+          </a:p>
+        </p:txBody>
+      </p:sp>
+      <p:sp>
+        <p:nvSpPr>
+          <p:cNvPr id="2" name="Slide Number Placeholder 1">
+            <a:extLst>
+              <a:ext uri="{FF2B5EF4-FFF2-40B4-BE49-F238E27FC236}">
+                <a16:creationId xmlns:a16="http://schemas.microsoft.com/office/drawing/2014/main" id="{E4398C1C-6656-4A73-A680-62A81CDC27FD}"/>
+              </a:ext>
+            </a:extLst>
+          </p:cNvPr>
+          <p:cNvSpPr>
+            <a:spLocks noGrp="1"/>
+          </p:cNvSpPr>
+          <p:nvPr>
+            <p:ph type="sldNum" sz="quarter" idx="12"/>
+          </p:nvPr>
+        </p:nvSpPr>
+        <p:spPr>
+          <a:xfrm>
+            <a:off x="11252200" y="6315075"/>
+            <a:ext cx="406400" cy="365125"/>
+          </a:xfrm>
+        </p:spPr>
+        <p:txBody>
+          <a:bodyPr anchor="ctr">
+            <a:normAutofit/>
+          </a:bodyPr>
+          <a:lstStyle/>
+          <a:p>
+            <a:pPr>
+              <a:spcAft>
+                <a:spcPts val="600"/>
+              </a:spcAft>
+            </a:pPr>
+            <a:fld id="{C263D6C4-4840-40CC-AC84-17E24B3B7BDE}" type="slidenum">
+              <a:rPr lang="en-US" smtClean="0"/>
+              <a:pPr>
+                <a:spcAft>
+                  <a:spcPts val="600"/>
+                </a:spcAft>
+              </a:pPr>
+              <a:t>11</a:t>
+            </a:fld>
+            <a:endParaRPr lang="en-US"/>
+          </a:p>
+        </p:txBody>
+      </p:sp>
+      <p:pic>
+        <p:nvPicPr>
+          <p:cNvPr id="5124" name="Picture 4">
+            <a:extLst>
+              <a:ext uri="{FF2B5EF4-FFF2-40B4-BE49-F238E27FC236}">
+                <a16:creationId xmlns:a16="http://schemas.microsoft.com/office/drawing/2014/main" id="{0CEE5048-383E-A78B-AD5A-787ADF364DD4}"/>
+              </a:ext>
+            </a:extLst>
+          </p:cNvPr>
+          <p:cNvPicPr>
+            <a:picLocks noChangeAspect="1" noChangeArrowheads="1"/>
+          </p:cNvPicPr>
+          <p:nvPr/>
+        </p:nvPicPr>
+        <p:blipFill>
+          <a:blip r:embed="rId2">
+            <a:extLst>
+              <a:ext uri="{28A0092B-C50C-407E-A947-70E740481C1C}">
+                <a14:useLocalDpi xmlns:a14="http://schemas.microsoft.com/office/drawing/2010/main" val="0"/>
+              </a:ext>
+            </a:extLst>
+          </a:blip>
+          <a:stretch>
+            <a:fillRect/>
+          </a:stretch>
+        </p:blipFill>
+        <p:spPr bwMode="auto">
+          <a:xfrm>
+            <a:off x="444500" y="1483603"/>
+            <a:ext cx="11214100" cy="4501170"/>
+          </a:xfrm>
+          <a:prstGeom prst="rect">
+            <a:avLst/>
+          </a:prstGeom>
+          <a:solidFill>
+            <a:srgbClr val="FFFFFF"/>
+          </a:solidFill>
+          <a:extLst>
+            <a:ext uri="{909E8E84-426E-40DD-AFC4-6F175D3DCCD1}">
+              <a14:hiddenFill xmlns:a14="http://schemas.microsoft.com/office/drawing/2010/main">
+                <a:solidFill>
+                  <a:srgbClr val="FFFFFF"/>
+                </a:solidFill>
+              </a14:hiddenFill>
+            </a:ext>
+          </a:extLst>
+        </p:spPr>
+      </p:pic>
+    </p:spTree>
+    <p:extLst>
+      <p:ext uri="{BB962C8B-B14F-4D97-AF65-F5344CB8AC3E}">
+        <p14:creationId xmlns:p14="http://schemas.microsoft.com/office/powerpoint/2010/main" val="2282987810"/>
+      </p:ext>
+    </p:extLst>
+  </p:cSld>
+  <p:clrMapOvr>
+    <a:masterClrMapping/>
+  </p:clrMapOvr>
+  <mc:AlternateContent xmlns:mc="http://schemas.openxmlformats.org/markup-compatibility/2006">
+    <mc:Choice xmlns:p14="http://schemas.microsoft.com/office/powerpoint/2010/main" Requires="p14">
+      <p:transition spd="med" p14:dur="700">
+        <p:fade/>
+      </p:transition>
+    </mc:Choice>
+    <mc:Fallback>
+      <p:transition spd="med">
+        <p:fade/>
+      </p:transition>
+    </mc:Fallback>
+  </mc:AlternateContent>
+</p:sld>
+</file>
+
+<file path=ppt/slides/slide12.xml><?xml version="1.0" encoding="utf-8"?>
+<p:sld xmlns:a="http://schemas.openxmlformats.org/drawingml/2006/main" xmlns:r="http://schemas.openxmlformats.org/officeDocument/2006/relationships" xmlns:p="http://schemas.openxmlformats.org/presentationml/2006/main">
+  <p:cSld>
+    <p:spTree>
+      <p:nvGrpSpPr>
+        <p:cNvPr id="1" name=""/>
+        <p:cNvGrpSpPr/>
+        <p:nvPr/>
+      </p:nvGrpSpPr>
+      <p:grpSpPr>
+        <a:xfrm>
+          <a:off x="0" y="0"/>
+          <a:ext cx="0" cy="0"/>
+          <a:chOff x="0" y="0"/>
+          <a:chExt cx="0" cy="0"/>
+        </a:xfrm>
+      </p:grpSpPr>
+      <p:sp>
+        <p:nvSpPr>
+          <p:cNvPr id="2" name="Title 1">
+            <a:extLst>
+              <a:ext uri="{FF2B5EF4-FFF2-40B4-BE49-F238E27FC236}">
+                <a16:creationId xmlns:a16="http://schemas.microsoft.com/office/drawing/2014/main" id="{632BE5BF-9922-45FB-8F3F-4446D40A051B}"/>
+              </a:ext>
+            </a:extLst>
+          </p:cNvPr>
+          <p:cNvSpPr>
+            <a:spLocks noGrp="1"/>
+          </p:cNvSpPr>
+          <p:nvPr>
+            <p:ph type="ctrTitle"/>
+          </p:nvPr>
+        </p:nvSpPr>
+        <p:spPr/>
+        <p:txBody>
+          <a:bodyPr/>
+          <a:lstStyle/>
+          <a:p>
+            <a:r>
+              <a:rPr lang="en-US" dirty="0"/>
+              <a:t>Thank You </a:t>
+            </a:r>
+            <a:endParaRPr lang="en-GB" dirty="0"/>
+          </a:p>
+        </p:txBody>
+      </p:sp>
+    </p:spTree>
+    <p:extLst>
+      <p:ext uri="{BB962C8B-B14F-4D97-AF65-F5344CB8AC3E}">
+        <p14:creationId xmlns:p14="http://schemas.microsoft.com/office/powerpoint/2010/main" val="429771863"/>
+      </p:ext>
+    </p:extLst>
+  </p:cSld>
+  <p:clrMapOvr>
+    <a:masterClrMapping/>
+  </p:clrMapOvr>
+  <p:transition spd="slow">
+    <p:wipe/>
+  </p:transition>
+</p:sld>
+</file>
+
 <file path=ppt/slides/slide2.xml><?xml version="1.0" encoding="utf-8"?>
 <p:sld xmlns:a="http://schemas.openxmlformats.org/drawingml/2006/main" xmlns:r="http://schemas.openxmlformats.org/officeDocument/2006/relationships" xmlns:p="http://schemas.openxmlformats.org/presentationml/2006/main">
   <p:cSld>
@@ -27232,13 +26729,13 @@
   <p:clrMapOvr>
     <a:masterClrMapping/>
   </p:clrMapOvr>
-  <mc:AlternateContent xmlns:mc="http://schemas.openxmlformats.org/markup-compatibility/2006">
-    <mc:Choice xmlns:p14="http://schemas.microsoft.com/office/powerpoint/2010/main" Requires="p14">
+  <mc:AlternateContent xmlns:mc="http://schemas.openxmlformats.org/markup-compatibility/2006" xmlns:p14="http://schemas.microsoft.com/office/powerpoint/2010/main">
+    <mc:Choice Requires="p14">
       <p:transition spd="med" p14:dur="700">
         <p:fade/>
       </p:transition>
     </mc:Choice>
-    <mc:Fallback>
+    <mc:Fallback xmlns="">
       <p:transition spd="med">
         <p:fade/>
       </p:transition>
@@ -27586,46 +27083,25 @@
             <p:ph type="title"/>
           </p:nvPr>
         </p:nvSpPr>
-        <p:spPr/>
+        <p:spPr>
+          <a:xfrm>
+            <a:off x="444500" y="542925"/>
+            <a:ext cx="11214100" cy="1282700"/>
+          </a:xfrm>
+        </p:spPr>
         <p:txBody>
-          <a:bodyPr/>
+          <a:bodyPr wrap="square" anchor="t">
+            <a:normAutofit/>
+          </a:bodyPr>
           <a:lstStyle/>
           <a:p>
             <a:r>
               <a:rPr lang="en-US" dirty="0"/>
-              <a:t>Chart</a:t>
+              <a:t>Chart Analysis:-  Median of all loan amount is almost same i.e. almost all demanded loan is funded.</a:t>
             </a:r>
           </a:p>
         </p:txBody>
       </p:sp>
-      <p:graphicFrame>
-        <p:nvGraphicFramePr>
-          <p:cNvPr id="7" name="Chart 6" title="Gross Revenue Placeholder Chart">
-            <a:extLst>
-              <a:ext uri="{FF2B5EF4-FFF2-40B4-BE49-F238E27FC236}">
-                <a16:creationId xmlns:a16="http://schemas.microsoft.com/office/drawing/2014/main" id="{19AEAA04-4840-FB41-B910-5F3570D85F0A}"/>
-              </a:ext>
-            </a:extLst>
-          </p:cNvPr>
-          <p:cNvGraphicFramePr/>
-          <p:nvPr>
-            <p:extLst>
-              <p:ext uri="{D42A27DB-BD31-4B8C-83A1-F6EECF244321}">
-                <p14:modId xmlns:p14="http://schemas.microsoft.com/office/powerpoint/2010/main" val="654825679"/>
-              </p:ext>
-            </p:extLst>
-          </p:nvPr>
-        </p:nvGraphicFramePr>
-        <p:xfrm>
-          <a:off x="1250950" y="1712075"/>
-          <a:ext cx="9690100" cy="4444199"/>
-        </p:xfrm>
-        <a:graphic>
-          <a:graphicData uri="http://schemas.openxmlformats.org/drawingml/2006/chart">
-            <c:chart xmlns:c="http://schemas.openxmlformats.org/drawingml/2006/chart" xmlns:r="http://schemas.openxmlformats.org/officeDocument/2006/relationships" r:id="rId2"/>
-          </a:graphicData>
-        </a:graphic>
-      </p:graphicFrame>
       <p:sp>
         <p:nvSpPr>
           <p:cNvPr id="2" name="Slide Number Placeholder 1">
@@ -27642,20 +27118,84 @@
             <p:ph type="sldNum" sz="quarter" idx="12"/>
           </p:nvPr>
         </p:nvSpPr>
-        <p:spPr/>
+        <p:spPr>
+          <a:xfrm>
+            <a:off x="11252200" y="6315075"/>
+            <a:ext cx="406400" cy="365125"/>
+          </a:xfrm>
+        </p:spPr>
         <p:txBody>
-          <a:bodyPr/>
+          <a:bodyPr anchor="ctr">
+            <a:normAutofit/>
+          </a:bodyPr>
           <a:lstStyle/>
           <a:p>
+            <a:pPr>
+              <a:spcAft>
+                <a:spcPts val="600"/>
+              </a:spcAft>
+            </a:pPr>
             <a:fld id="{C263D6C4-4840-40CC-AC84-17E24B3B7BDE}" type="slidenum">
               <a:rPr lang="en-US" smtClean="0"/>
-              <a:pPr/>
+              <a:pPr>
+                <a:spcAft>
+                  <a:spcPts val="600"/>
+                </a:spcAft>
+              </a:pPr>
               <a:t>7</a:t>
             </a:fld>
-            <a:endParaRPr lang="en-US" dirty="0"/>
+            <a:endParaRPr lang="en-US"/>
           </a:p>
         </p:txBody>
       </p:sp>
+      <p:pic>
+        <p:nvPicPr>
+          <p:cNvPr id="1026" name="Picture 2">
+            <a:extLst>
+              <a:ext uri="{FF2B5EF4-FFF2-40B4-BE49-F238E27FC236}">
+                <a16:creationId xmlns:a16="http://schemas.microsoft.com/office/drawing/2014/main" id="{BD643B7D-423D-B82F-2700-DDDD37C94FBA}"/>
+              </a:ext>
+            </a:extLst>
+          </p:cNvPr>
+          <p:cNvPicPr>
+            <a:picLocks noChangeAspect="1" noChangeArrowheads="1"/>
+          </p:cNvPicPr>
+          <p:nvPr/>
+        </p:nvPicPr>
+        <p:blipFill>
+          <a:blip r:embed="rId2">
+            <a:extLst>
+              <a:ext uri="{28A0092B-C50C-407E-A947-70E740481C1C}">
+                <a14:useLocalDpi xmlns:a14="http://schemas.microsoft.com/office/drawing/2010/main" val="0"/>
+              </a:ext>
+            </a:extLst>
+          </a:blip>
+          <a:stretch>
+            <a:fillRect/>
+          </a:stretch>
+        </p:blipFill>
+        <p:spPr bwMode="auto">
+          <a:xfrm>
+            <a:off x="2660784" y="1825625"/>
+            <a:ext cx="6780397" cy="4351338"/>
+          </a:xfrm>
+          <a:prstGeom prst="rect">
+            <a:avLst/>
+          </a:prstGeom>
+          <a:solidFill>
+            <a:srgbClr val="FFFFFF"/>
+          </a:solidFill>
+          <a:extLst>
+            <a:ext uri="{909E8E84-426E-40DD-AFC4-6F175D3DCCD1}">
+              <a14:hiddenFill xmlns:a14="http://schemas.microsoft.com/office/drawing/2010/main">
+                <a:solidFill>
+                  <a:srgbClr val="FFFFFF"/>
+                </a:solidFill>
+              </a14:hiddenFill>
+            </a:ext>
+          </a:extLst>
+        </p:spPr>
+      </p:pic>
     </p:spTree>
     <p:extLst>
       <p:ext uri="{BB962C8B-B14F-4D97-AF65-F5344CB8AC3E}">
@@ -27700,10 +27240,10 @@
       </p:grpSpPr>
       <p:sp>
         <p:nvSpPr>
-          <p:cNvPr id="2" name="Title 1">
+          <p:cNvPr id="5" name="Title 4">
             <a:extLst>
               <a:ext uri="{FF2B5EF4-FFF2-40B4-BE49-F238E27FC236}">
-                <a16:creationId xmlns:a16="http://schemas.microsoft.com/office/drawing/2014/main" id="{632BE5BF-9922-45FB-8F3F-4446D40A051B}"/>
+                <a16:creationId xmlns:a16="http://schemas.microsoft.com/office/drawing/2014/main" id="{201323FB-427E-4A8D-B473-AB0657D8D23B}"/>
               </a:ext>
             </a:extLst>
           </p:cNvPr>
@@ -27711,35 +27251,354 @@
             <a:spLocks noGrp="1"/>
           </p:cNvSpPr>
           <p:nvPr>
-            <p:ph type="ctrTitle"/>
+            <p:ph type="title"/>
           </p:nvPr>
         </p:nvSpPr>
-        <p:spPr/>
+        <p:spPr>
+          <a:xfrm>
+            <a:off x="444500" y="542925"/>
+            <a:ext cx="11214100" cy="535531"/>
+          </a:xfrm>
+        </p:spPr>
+        <p:txBody>
+          <a:bodyPr wrap="square" anchor="t">
+            <a:normAutofit/>
+          </a:bodyPr>
+          <a:lstStyle/>
+          <a:p>
+            <a:r>
+              <a:rPr lang="en-US" sz="2000" dirty="0"/>
+              <a:t>Observations :-  Less tenure of loan is more likely to default than higher tenure</a:t>
+            </a:r>
+          </a:p>
+        </p:txBody>
+      </p:sp>
+      <p:sp>
+        <p:nvSpPr>
+          <p:cNvPr id="2" name="Slide Number Placeholder 1">
+            <a:extLst>
+              <a:ext uri="{FF2B5EF4-FFF2-40B4-BE49-F238E27FC236}">
+                <a16:creationId xmlns:a16="http://schemas.microsoft.com/office/drawing/2014/main" id="{E4398C1C-6656-4A73-A680-62A81CDC27FD}"/>
+              </a:ext>
+            </a:extLst>
+          </p:cNvPr>
+          <p:cNvSpPr>
+            <a:spLocks noGrp="1"/>
+          </p:cNvSpPr>
+          <p:nvPr>
+            <p:ph type="sldNum" sz="quarter" idx="12"/>
+          </p:nvPr>
+        </p:nvSpPr>
+        <p:spPr>
+          <a:xfrm>
+            <a:off x="11252200" y="6315075"/>
+            <a:ext cx="406400" cy="365125"/>
+          </a:xfrm>
+        </p:spPr>
+        <p:txBody>
+          <a:bodyPr anchor="ctr">
+            <a:normAutofit/>
+          </a:bodyPr>
+          <a:lstStyle/>
+          <a:p>
+            <a:pPr>
+              <a:spcAft>
+                <a:spcPts val="600"/>
+              </a:spcAft>
+            </a:pPr>
+            <a:fld id="{C263D6C4-4840-40CC-AC84-17E24B3B7BDE}" type="slidenum">
+              <a:rPr lang="en-US" smtClean="0"/>
+              <a:pPr>
+                <a:spcAft>
+                  <a:spcPts val="600"/>
+                </a:spcAft>
+              </a:pPr>
+              <a:t>8</a:t>
+            </a:fld>
+            <a:endParaRPr lang="en-US"/>
+          </a:p>
+        </p:txBody>
+      </p:sp>
+      <p:pic>
+        <p:nvPicPr>
+          <p:cNvPr id="2050" name="Picture 2">
+            <a:extLst>
+              <a:ext uri="{FF2B5EF4-FFF2-40B4-BE49-F238E27FC236}">
+                <a16:creationId xmlns:a16="http://schemas.microsoft.com/office/drawing/2014/main" id="{D363A8CA-47AE-DAF8-72F3-5D91B8CE1A67}"/>
+              </a:ext>
+            </a:extLst>
+          </p:cNvPr>
+          <p:cNvPicPr>
+            <a:picLocks noChangeAspect="1" noChangeArrowheads="1"/>
+          </p:cNvPicPr>
+          <p:nvPr/>
+        </p:nvPicPr>
+        <p:blipFill>
+          <a:blip r:embed="rId2">
+            <a:extLst>
+              <a:ext uri="{28A0092B-C50C-407E-A947-70E740481C1C}">
+                <a14:useLocalDpi xmlns:a14="http://schemas.microsoft.com/office/drawing/2010/main" val="0"/>
+              </a:ext>
+            </a:extLst>
+          </a:blip>
+          <a:stretch>
+            <a:fillRect/>
+          </a:stretch>
+        </p:blipFill>
+        <p:spPr bwMode="auto">
+          <a:xfrm>
+            <a:off x="1125415" y="1444649"/>
+            <a:ext cx="9717489" cy="4579079"/>
+          </a:xfrm>
+          <a:prstGeom prst="rect">
+            <a:avLst/>
+          </a:prstGeom>
+          <a:solidFill>
+            <a:srgbClr val="FFFFFF"/>
+          </a:solidFill>
+          <a:extLst>
+            <a:ext uri="{909E8E84-426E-40DD-AFC4-6F175D3DCCD1}">
+              <a14:hiddenFill xmlns:a14="http://schemas.microsoft.com/office/drawing/2010/main">
+                <a:solidFill>
+                  <a:srgbClr val="FFFFFF"/>
+                </a:solidFill>
+              </a14:hiddenFill>
+            </a:ext>
+          </a:extLst>
+        </p:spPr>
+      </p:pic>
+      <p:sp>
+        <p:nvSpPr>
+          <p:cNvPr id="71" name="Text Placeholder 4">
+            <a:extLst>
+              <a:ext uri="{FF2B5EF4-FFF2-40B4-BE49-F238E27FC236}">
+                <a16:creationId xmlns:a16="http://schemas.microsoft.com/office/drawing/2014/main" id="{7B46AD3E-EB8C-B8F3-4410-788E65E0333A}"/>
+              </a:ext>
+            </a:extLst>
+          </p:cNvPr>
+          <p:cNvSpPr>
+            <a:spLocks noGrp="1"/>
+          </p:cNvSpPr>
+          <p:nvPr>
+            <p:ph type="body" sz="half" idx="2"/>
+          </p:nvPr>
+        </p:nvSpPr>
+        <p:spPr>
+          <a:xfrm>
+            <a:off x="443366" y="1444649"/>
+            <a:ext cx="3365063" cy="4579079"/>
+          </a:xfrm>
+        </p:spPr>
         <p:txBody>
           <a:bodyPr/>
           <a:lstStyle/>
           <a:p>
             <a:r>
               <a:rPr lang="en-US" dirty="0"/>
-              <a:t>Thank You </a:t>
+              <a:t>Observations: </a:t>
             </a:r>
-            <a:endParaRPr lang="en-GB" dirty="0"/>
           </a:p>
         </p:txBody>
       </p:sp>
     </p:spTree>
     <p:extLst>
       <p:ext uri="{BB962C8B-B14F-4D97-AF65-F5344CB8AC3E}">
-        <p14:creationId xmlns:p14="http://schemas.microsoft.com/office/powerpoint/2010/main" val="429771863"/>
+        <p14:creationId xmlns:p14="http://schemas.microsoft.com/office/powerpoint/2010/main" val="1913011041"/>
       </p:ext>
     </p:extLst>
   </p:cSld>
   <p:clrMapOvr>
     <a:masterClrMapping/>
   </p:clrMapOvr>
-  <p:transition spd="slow">
-    <p:wipe/>
-  </p:transition>
+  <mc:AlternateContent xmlns:mc="http://schemas.openxmlformats.org/markup-compatibility/2006">
+    <mc:Choice xmlns:p14="http://schemas.microsoft.com/office/powerpoint/2010/main" Requires="p14">
+      <p:transition spd="med" p14:dur="700">
+        <p:fade/>
+      </p:transition>
+    </mc:Choice>
+    <mc:Fallback>
+      <p:transition spd="med">
+        <p:fade/>
+      </p:transition>
+    </mc:Fallback>
+  </mc:AlternateContent>
+</p:sld>
+</file>
+
+<file path=ppt/slides/slide9.xml><?xml version="1.0" encoding="utf-8"?>
+<p:sld xmlns:a="http://schemas.openxmlformats.org/drawingml/2006/main" xmlns:r="http://schemas.openxmlformats.org/officeDocument/2006/relationships" xmlns:p="http://schemas.openxmlformats.org/presentationml/2006/main">
+  <p:cSld>
+    <p:spTree>
+      <p:nvGrpSpPr>
+        <p:cNvPr id="1" name=""/>
+        <p:cNvGrpSpPr/>
+        <p:nvPr/>
+      </p:nvGrpSpPr>
+      <p:grpSpPr>
+        <a:xfrm>
+          <a:off x="0" y="0"/>
+          <a:ext cx="0" cy="0"/>
+          <a:chOff x="0" y="0"/>
+          <a:chExt cx="0" cy="0"/>
+        </a:xfrm>
+      </p:grpSpPr>
+      <p:sp>
+        <p:nvSpPr>
+          <p:cNvPr id="5" name="Title 4">
+            <a:extLst>
+              <a:ext uri="{FF2B5EF4-FFF2-40B4-BE49-F238E27FC236}">
+                <a16:creationId xmlns:a16="http://schemas.microsoft.com/office/drawing/2014/main" id="{201323FB-427E-4A8D-B473-AB0657D8D23B}"/>
+              </a:ext>
+            </a:extLst>
+          </p:cNvPr>
+          <p:cNvSpPr>
+            <a:spLocks noGrp="1"/>
+          </p:cNvSpPr>
+          <p:nvPr>
+            <p:ph type="title"/>
+          </p:nvPr>
+        </p:nvSpPr>
+        <p:spPr>
+          <a:xfrm>
+            <a:off x="444500" y="542925"/>
+            <a:ext cx="11214100" cy="535531"/>
+          </a:xfrm>
+        </p:spPr>
+        <p:txBody>
+          <a:bodyPr wrap="square" anchor="t">
+            <a:normAutofit fontScale="90000"/>
+          </a:bodyPr>
+          <a:lstStyle/>
+          <a:p>
+            <a:r>
+              <a:rPr lang="en-US" sz="2000" dirty="0"/>
+              <a:t>Observations :-  Grade plays important role in loan default rate. Grade B loan is having highest default rate than </a:t>
+            </a:r>
+            <a:br>
+              <a:rPr lang="en-US" sz="2000" dirty="0"/>
+            </a:br>
+            <a:r>
+              <a:rPr lang="en-US" sz="2000" dirty="0"/>
+              <a:t>loan having grade G </a:t>
+            </a:r>
+          </a:p>
+        </p:txBody>
+      </p:sp>
+      <p:sp>
+        <p:nvSpPr>
+          <p:cNvPr id="2" name="Slide Number Placeholder 1">
+            <a:extLst>
+              <a:ext uri="{FF2B5EF4-FFF2-40B4-BE49-F238E27FC236}">
+                <a16:creationId xmlns:a16="http://schemas.microsoft.com/office/drawing/2014/main" id="{E4398C1C-6656-4A73-A680-62A81CDC27FD}"/>
+              </a:ext>
+            </a:extLst>
+          </p:cNvPr>
+          <p:cNvSpPr>
+            <a:spLocks noGrp="1"/>
+          </p:cNvSpPr>
+          <p:nvPr>
+            <p:ph type="sldNum" sz="quarter" idx="12"/>
+          </p:nvPr>
+        </p:nvSpPr>
+        <p:spPr>
+          <a:xfrm>
+            <a:off x="11252200" y="6315075"/>
+            <a:ext cx="406400" cy="365125"/>
+          </a:xfrm>
+        </p:spPr>
+        <p:txBody>
+          <a:bodyPr anchor="ctr">
+            <a:normAutofit/>
+          </a:bodyPr>
+          <a:lstStyle/>
+          <a:p>
+            <a:pPr>
+              <a:spcAft>
+                <a:spcPts val="600"/>
+              </a:spcAft>
+            </a:pPr>
+            <a:fld id="{C263D6C4-4840-40CC-AC84-17E24B3B7BDE}" type="slidenum">
+              <a:rPr lang="en-US" smtClean="0"/>
+              <a:pPr>
+                <a:spcAft>
+                  <a:spcPts val="600"/>
+                </a:spcAft>
+              </a:pPr>
+              <a:t>9</a:t>
+            </a:fld>
+            <a:endParaRPr lang="en-US"/>
+          </a:p>
+        </p:txBody>
+      </p:sp>
+      <p:pic>
+        <p:nvPicPr>
+          <p:cNvPr id="3074" name="Picture 2">
+            <a:extLst>
+              <a:ext uri="{FF2B5EF4-FFF2-40B4-BE49-F238E27FC236}">
+                <a16:creationId xmlns:a16="http://schemas.microsoft.com/office/drawing/2014/main" id="{2DBC0CF7-20CB-A24C-6E10-4C61473B05E2}"/>
+              </a:ext>
+            </a:extLst>
+          </p:cNvPr>
+          <p:cNvPicPr>
+            <a:picLocks noChangeAspect="1" noChangeArrowheads="1"/>
+          </p:cNvPicPr>
+          <p:nvPr/>
+        </p:nvPicPr>
+        <p:blipFill>
+          <a:blip r:embed="rId2">
+            <a:extLst>
+              <a:ext uri="{28A0092B-C50C-407E-A947-70E740481C1C}">
+                <a14:useLocalDpi xmlns:a14="http://schemas.microsoft.com/office/drawing/2010/main" val="0"/>
+              </a:ext>
+            </a:extLst>
+          </a:blip>
+          <a:srcRect/>
+          <a:stretch>
+            <a:fillRect/>
+          </a:stretch>
+        </p:blipFill>
+        <p:spPr bwMode="auto">
+          <a:xfrm>
+            <a:off x="942534" y="1962149"/>
+            <a:ext cx="10522635" cy="3678995"/>
+          </a:xfrm>
+          <a:prstGeom prst="rect">
+            <a:avLst/>
+          </a:prstGeom>
+          <a:noFill/>
+          <a:extLst>
+            <a:ext uri="{909E8E84-426E-40DD-AFC4-6F175D3DCCD1}">
+              <a14:hiddenFill xmlns:a14="http://schemas.microsoft.com/office/drawing/2010/main">
+                <a:solidFill>
+                  <a:srgbClr val="FFFFFF"/>
+                </a:solidFill>
+              </a14:hiddenFill>
+            </a:ext>
+          </a:extLst>
+        </p:spPr>
+      </p:pic>
+    </p:spTree>
+    <p:extLst>
+      <p:ext uri="{BB962C8B-B14F-4D97-AF65-F5344CB8AC3E}">
+        <p14:creationId xmlns:p14="http://schemas.microsoft.com/office/powerpoint/2010/main" val="4261179646"/>
+      </p:ext>
+    </p:extLst>
+  </p:cSld>
+  <p:clrMapOvr>
+    <a:masterClrMapping/>
+  </p:clrMapOvr>
+  <mc:AlternateContent xmlns:mc="http://schemas.openxmlformats.org/markup-compatibility/2006">
+    <mc:Choice xmlns:p14="http://schemas.microsoft.com/office/powerpoint/2010/main" Requires="p14">
+      <p:transition spd="med" p14:dur="700">
+        <p:fade/>
+      </p:transition>
+    </mc:Choice>
+    <mc:Fallback>
+      <p:transition spd="med">
+        <p:fade/>
+      </p:transition>
+    </mc:Fallback>
+  </mc:AlternateContent>
 </p:sld>
 </file>
 
@@ -28535,20 +28394,20 @@
 </file>
 
 <file path=customXml/item1.xml><?xml version="1.0" encoding="utf-8"?>
-<p:properties xmlns:p="http://schemas.microsoft.com/office/2006/metadata/properties" xmlns:xsi="http://www.w3.org/2001/XMLSchema-instance" xmlns:pc="http://schemas.microsoft.com/office/infopath/2007/PartnerControls">
-  <documentManagement>
-    <MediaServiceKeyPoints xmlns="71af3243-3dd4-4a8d-8c0d-dd76da1f02a5" xsi:nil="true"/>
-  </documentManagement>
-</p:properties>
-</file>
-
-<file path=customXml/item2.xml><?xml version="1.0" encoding="utf-8"?>
 <?mso-contentType ?>
 <FormTemplates xmlns="http://schemas.microsoft.com/sharepoint/v3/contenttype/forms">
   <Display>DocumentLibraryForm</Display>
   <Edit>DocumentLibraryForm</Edit>
   <New>DocumentLibraryForm</New>
 </FormTemplates>
+</file>
+
+<file path=customXml/item2.xml><?xml version="1.0" encoding="utf-8"?>
+<p:properties xmlns:p="http://schemas.microsoft.com/office/2006/metadata/properties" xmlns:xsi="http://www.w3.org/2001/XMLSchema-instance" xmlns:pc="http://schemas.microsoft.com/office/infopath/2007/PartnerControls">
+  <documentManagement>
+    <MediaServiceKeyPoints xmlns="71af3243-3dd4-4a8d-8c0d-dd76da1f02a5" xsi:nil="true"/>
+  </documentManagement>
+</p:properties>
 </file>
 
 <file path=customXml/item3.xml><?xml version="1.0" encoding="utf-8"?>
@@ -28763,19 +28622,19 @@
 </file>
 
 <file path=customXml/itemProps1.xml><?xml version="1.0" encoding="utf-8"?>
+<ds:datastoreItem xmlns:ds="http://schemas.openxmlformats.org/officeDocument/2006/customXml" ds:itemID="{5B26E0C9-B2AA-42E6-97B6-E1B7D9EAF129}">
+  <ds:schemaRefs>
+    <ds:schemaRef ds:uri="http://schemas.microsoft.com/sharepoint/v3/contenttype/forms"/>
+  </ds:schemaRefs>
+</ds:datastoreItem>
+</file>
+
+<file path=customXml/itemProps2.xml><?xml version="1.0" encoding="utf-8"?>
 <ds:datastoreItem xmlns:ds="http://schemas.openxmlformats.org/officeDocument/2006/customXml" ds:itemID="{F5757914-1161-4661-9696-421FD6935CDD}">
   <ds:schemaRefs>
     <ds:schemaRef ds:uri="http://schemas.microsoft.com/office/2006/metadata/properties"/>
     <ds:schemaRef ds:uri="http://schemas.microsoft.com/office/infopath/2007/PartnerControls"/>
     <ds:schemaRef ds:uri="71af3243-3dd4-4a8d-8c0d-dd76da1f02a5"/>
-  </ds:schemaRefs>
-</ds:datastoreItem>
-</file>
-
-<file path=customXml/itemProps2.xml><?xml version="1.0" encoding="utf-8"?>
-<ds:datastoreItem xmlns:ds="http://schemas.openxmlformats.org/officeDocument/2006/customXml" ds:itemID="{5B26E0C9-B2AA-42E6-97B6-E1B7D9EAF129}">
-  <ds:schemaRefs>
-    <ds:schemaRef ds:uri="http://schemas.microsoft.com/sharepoint/v3/contenttype/forms"/>
   </ds:schemaRefs>
 </ds:datastoreItem>
 </file>

</xml_diff>